<commit_message>
Last changes to PPT
</commit_message>
<xml_diff>
--- a/Final_Presentation.pptx
+++ b/Final_Presentation.pptx
@@ -1001,6 +1001,13 @@
         </dgm:presLayoutVars>
       </dgm:prSet>
       <dgm:spPr/>
+      <dgm:t>
+        <a:bodyPr/>
+        <a:lstStyle/>
+        <a:p>
+          <a:endParaRPr lang="en-US"/>
+        </a:p>
+      </dgm:t>
     </dgm:pt>
     <dgm:pt modelId="{079CEEB1-01A1-4A77-B6E1-EA4790FDA235}" type="pres">
       <dgm:prSet presAssocID="{4A461211-3D07-4465-806D-10BB0E4FE9E8}" presName="node" presStyleLbl="node1" presStyleIdx="0" presStyleCnt="3" custRadScaleRad="101303" custRadScaleInc="541">
@@ -1020,10 +1027,24 @@
     <dgm:pt modelId="{B4879E9B-36F3-4AEA-90BF-9D3C10E3A788}" type="pres">
       <dgm:prSet presAssocID="{B8EF0B21-4E9C-47F0-8092-A53E5EA4A498}" presName="sibTrans" presStyleLbl="sibTrans2D1" presStyleIdx="0" presStyleCnt="3"/>
       <dgm:spPr/>
+      <dgm:t>
+        <a:bodyPr/>
+        <a:lstStyle/>
+        <a:p>
+          <a:endParaRPr lang="en-US"/>
+        </a:p>
+      </dgm:t>
     </dgm:pt>
     <dgm:pt modelId="{BD98F67B-DEC7-40CC-99F4-74040632297F}" type="pres">
       <dgm:prSet presAssocID="{B8EF0B21-4E9C-47F0-8092-A53E5EA4A498}" presName="connectorText" presStyleLbl="sibTrans2D1" presStyleIdx="0" presStyleCnt="3"/>
       <dgm:spPr/>
+      <dgm:t>
+        <a:bodyPr/>
+        <a:lstStyle/>
+        <a:p>
+          <a:endParaRPr lang="en-US"/>
+        </a:p>
+      </dgm:t>
     </dgm:pt>
     <dgm:pt modelId="{E0D70061-08EA-4537-9EDA-F6850A0C474F}" type="pres">
       <dgm:prSet presAssocID="{A6C8C660-2756-44AC-A688-E114B04B68BF}" presName="node" presStyleLbl="node1" presStyleIdx="1" presStyleCnt="3">
@@ -1032,14 +1053,35 @@
         </dgm:presLayoutVars>
       </dgm:prSet>
       <dgm:spPr/>
+      <dgm:t>
+        <a:bodyPr/>
+        <a:lstStyle/>
+        <a:p>
+          <a:endParaRPr lang="en-US"/>
+        </a:p>
+      </dgm:t>
     </dgm:pt>
     <dgm:pt modelId="{19868D4B-2179-4E67-932C-6EA567EBC97C}" type="pres">
       <dgm:prSet presAssocID="{06660E28-B043-4878-A6B4-4BE99C846822}" presName="sibTrans" presStyleLbl="sibTrans2D1" presStyleIdx="1" presStyleCnt="3"/>
       <dgm:spPr/>
+      <dgm:t>
+        <a:bodyPr/>
+        <a:lstStyle/>
+        <a:p>
+          <a:endParaRPr lang="en-US"/>
+        </a:p>
+      </dgm:t>
     </dgm:pt>
     <dgm:pt modelId="{46B826E3-26F2-4405-AB73-6D87C6801704}" type="pres">
       <dgm:prSet presAssocID="{06660E28-B043-4878-A6B4-4BE99C846822}" presName="connectorText" presStyleLbl="sibTrans2D1" presStyleIdx="1" presStyleCnt="3"/>
       <dgm:spPr/>
+      <dgm:t>
+        <a:bodyPr/>
+        <a:lstStyle/>
+        <a:p>
+          <a:endParaRPr lang="en-US"/>
+        </a:p>
+      </dgm:t>
     </dgm:pt>
     <dgm:pt modelId="{48F20608-A56C-4AAE-93EC-C6968C34FA44}" type="pres">
       <dgm:prSet presAssocID="{D9B26122-41E5-48D0-B65D-377F5873D9D0}" presName="node" presStyleLbl="node1" presStyleIdx="2" presStyleCnt="3">
@@ -1059,10 +1101,24 @@
     <dgm:pt modelId="{665AA246-8A7D-40A3-9206-7BE43F7DD10B}" type="pres">
       <dgm:prSet presAssocID="{DDBD3D8C-6AE5-47AB-B86C-FC72225AC040}" presName="sibTrans" presStyleLbl="sibTrans2D1" presStyleIdx="2" presStyleCnt="3"/>
       <dgm:spPr/>
+      <dgm:t>
+        <a:bodyPr/>
+        <a:lstStyle/>
+        <a:p>
+          <a:endParaRPr lang="en-US"/>
+        </a:p>
+      </dgm:t>
     </dgm:pt>
     <dgm:pt modelId="{00084EE1-73FA-4357-8434-5E53D963C1F1}" type="pres">
       <dgm:prSet presAssocID="{DDBD3D8C-6AE5-47AB-B86C-FC72225AC040}" presName="connectorText" presStyleLbl="sibTrans2D1" presStyleIdx="2" presStyleCnt="3"/>
       <dgm:spPr/>
+      <dgm:t>
+        <a:bodyPr/>
+        <a:lstStyle/>
+        <a:p>
+          <a:endParaRPr lang="en-US"/>
+        </a:p>
+      </dgm:t>
     </dgm:pt>
   </dgm:ptLst>
   <dgm:cxnLst>
@@ -2993,7 +3049,7 @@
           <a:p>
             <a:fld id="{3FBB3453-B19B-49F8-8325-D30B26033753}" type="datetimeFigureOut">
               <a:rPr lang="en-US" smtClean="0"/>
-              <a:t>8/13/2018</a:t>
+              <a:t>8/14/2018</a:t>
             </a:fld>
             <a:endParaRPr lang="en-US"/>
           </a:p>
@@ -3274,7 +3330,7 @@
           <a:p>
             <a:fld id="{3FBB3453-B19B-49F8-8325-D30B26033753}" type="datetimeFigureOut">
               <a:rPr lang="en-US" smtClean="0"/>
-              <a:t>8/13/2018</a:t>
+              <a:t>8/14/2018</a:t>
             </a:fld>
             <a:endParaRPr lang="en-US"/>
           </a:p>
@@ -3466,7 +3522,7 @@
           <a:p>
             <a:fld id="{3FBB3453-B19B-49F8-8325-D30B26033753}" type="datetimeFigureOut">
               <a:rPr lang="en-US" smtClean="0"/>
-              <a:t>8/13/2018</a:t>
+              <a:t>8/14/2018</a:t>
             </a:fld>
             <a:endParaRPr lang="en-US"/>
           </a:p>
@@ -3727,7 +3783,7 @@
           <a:p>
             <a:fld id="{3FBB3453-B19B-49F8-8325-D30B26033753}" type="datetimeFigureOut">
               <a:rPr lang="en-US" smtClean="0"/>
-              <a:t>8/13/2018</a:t>
+              <a:t>8/14/2018</a:t>
             </a:fld>
             <a:endParaRPr lang="en-US"/>
           </a:p>
@@ -4153,7 +4209,7 @@
           <a:p>
             <a:fld id="{3FBB3453-B19B-49F8-8325-D30B26033753}" type="datetimeFigureOut">
               <a:rPr lang="en-US" smtClean="0"/>
-              <a:t>8/13/2018</a:t>
+              <a:t>8/14/2018</a:t>
             </a:fld>
             <a:endParaRPr lang="en-US"/>
           </a:p>
@@ -4699,7 +4755,7 @@
           <a:p>
             <a:fld id="{3FBB3453-B19B-49F8-8325-D30B26033753}" type="datetimeFigureOut">
               <a:rPr lang="en-US" smtClean="0"/>
-              <a:t>8/13/2018</a:t>
+              <a:t>8/14/2018</a:t>
             </a:fld>
             <a:endParaRPr lang="en-US"/>
           </a:p>
@@ -5530,7 +5586,7 @@
           <a:p>
             <a:fld id="{3FBB3453-B19B-49F8-8325-D30B26033753}" type="datetimeFigureOut">
               <a:rPr lang="en-US" smtClean="0"/>
-              <a:t>8/13/2018</a:t>
+              <a:t>8/14/2018</a:t>
             </a:fld>
             <a:endParaRPr lang="en-US"/>
           </a:p>
@@ -5700,7 +5756,7 @@
           <a:p>
             <a:fld id="{3FBB3453-B19B-49F8-8325-D30B26033753}" type="datetimeFigureOut">
               <a:rPr lang="en-US" smtClean="0"/>
-              <a:t>8/13/2018</a:t>
+              <a:t>8/14/2018</a:t>
             </a:fld>
             <a:endParaRPr lang="en-US"/>
           </a:p>
@@ -5880,7 +5936,7 @@
           <a:p>
             <a:fld id="{3FBB3453-B19B-49F8-8325-D30B26033753}" type="datetimeFigureOut">
               <a:rPr lang="en-US" smtClean="0"/>
-              <a:t>8/13/2018</a:t>
+              <a:t>8/14/2018</a:t>
             </a:fld>
             <a:endParaRPr lang="en-US"/>
           </a:p>
@@ -6050,7 +6106,7 @@
           <a:p>
             <a:fld id="{3FBB3453-B19B-49F8-8325-D30B26033753}" type="datetimeFigureOut">
               <a:rPr lang="en-US" smtClean="0"/>
-              <a:t>8/13/2018</a:t>
+              <a:t>8/14/2018</a:t>
             </a:fld>
             <a:endParaRPr lang="en-US"/>
           </a:p>
@@ -6307,7 +6363,7 @@
           <a:p>
             <a:fld id="{3FBB3453-B19B-49F8-8325-D30B26033753}" type="datetimeFigureOut">
               <a:rPr lang="en-US" smtClean="0"/>
-              <a:t>8/13/2018</a:t>
+              <a:t>8/14/2018</a:t>
             </a:fld>
             <a:endParaRPr lang="en-US"/>
           </a:p>
@@ -6539,7 +6595,7 @@
           <a:p>
             <a:fld id="{3FBB3453-B19B-49F8-8325-D30B26033753}" type="datetimeFigureOut">
               <a:rPr lang="en-US" smtClean="0"/>
-              <a:t>8/13/2018</a:t>
+              <a:t>8/14/2018</a:t>
             </a:fld>
             <a:endParaRPr lang="en-US"/>
           </a:p>
@@ -6932,7 +6988,7 @@
           <a:p>
             <a:fld id="{3FBB3453-B19B-49F8-8325-D30B26033753}" type="datetimeFigureOut">
               <a:rPr lang="en-US" smtClean="0"/>
-              <a:t>8/13/2018</a:t>
+              <a:t>8/14/2018</a:t>
             </a:fld>
             <a:endParaRPr lang="en-US"/>
           </a:p>
@@ -7050,7 +7106,7 @@
           <a:p>
             <a:fld id="{3FBB3453-B19B-49F8-8325-D30B26033753}" type="datetimeFigureOut">
               <a:rPr lang="en-US" smtClean="0"/>
-              <a:t>8/13/2018</a:t>
+              <a:t>8/14/2018</a:t>
             </a:fld>
             <a:endParaRPr lang="en-US"/>
           </a:p>
@@ -7145,7 +7201,7 @@
           <a:p>
             <a:fld id="{3FBB3453-B19B-49F8-8325-D30B26033753}" type="datetimeFigureOut">
               <a:rPr lang="en-US" smtClean="0"/>
-              <a:t>8/13/2018</a:t>
+              <a:t>8/14/2018</a:t>
             </a:fld>
             <a:endParaRPr lang="en-US"/>
           </a:p>
@@ -7418,7 +7474,7 @@
           <a:p>
             <a:fld id="{3FBB3453-B19B-49F8-8325-D30B26033753}" type="datetimeFigureOut">
               <a:rPr lang="en-US" smtClean="0"/>
-              <a:t>8/13/2018</a:t>
+              <a:t>8/14/2018</a:t>
             </a:fld>
             <a:endParaRPr lang="en-US"/>
           </a:p>
@@ -7699,7 +7755,7 @@
           <a:p>
             <a:fld id="{3FBB3453-B19B-49F8-8325-D30B26033753}" type="datetimeFigureOut">
               <a:rPr lang="en-US" smtClean="0"/>
-              <a:t>8/13/2018</a:t>
+              <a:t>8/14/2018</a:t>
             </a:fld>
             <a:endParaRPr lang="en-US"/>
           </a:p>
@@ -7939,7 +7995,7 @@
           <a:p>
             <a:fld id="{3FBB3453-B19B-49F8-8325-D30B26033753}" type="datetimeFigureOut">
               <a:rPr lang="en-US" smtClean="0"/>
-              <a:t>8/13/2018</a:t>
+              <a:t>8/14/2018</a:t>
             </a:fld>
             <a:endParaRPr lang="en-US"/>
           </a:p>
@@ -8726,27 +8782,7 @@
             </a:r>
             <a:r>
               <a:rPr lang="en-US" dirty="0" smtClean="0"/>
-              <a:t> Break </a:t>
-            </a:r>
-            <a:r>
-              <a:rPr lang="en-US" dirty="0" smtClean="0"/>
-              <a:t>Playfair encryption with </a:t>
-            </a:r>
-            <a:r>
-              <a:rPr lang="en-US" dirty="0" smtClean="0"/>
-              <a:t>narrowly-focused brute </a:t>
-            </a:r>
-            <a:r>
-              <a:rPr lang="en-US" dirty="0" smtClean="0"/>
-              <a:t>force </a:t>
-            </a:r>
-            <a:r>
-              <a:rPr lang="en-US" dirty="0" smtClean="0"/>
-              <a:t>method using an annealing </a:t>
-            </a:r>
-            <a:r>
-              <a:rPr lang="en-US" dirty="0" smtClean="0"/>
-              <a:t>algorithm</a:t>
+              <a:t> Break Playfair encryption with narrowly-focused brute force method using an annealing algorithm</a:t>
             </a:r>
           </a:p>
           <a:p>
@@ -8775,11 +8811,7 @@
             <a:pPr lvl="1"/>
             <a:r>
               <a:rPr lang="en-US" dirty="0" smtClean="0"/>
-              <a:t>High </a:t>
-            </a:r>
-            <a:r>
-              <a:rPr lang="en-US" dirty="0" smtClean="0"/>
-              <a:t>level explanation</a:t>
+              <a:t>High level explanation</a:t>
             </a:r>
           </a:p>
           <a:p>
@@ -9426,7 +9458,6 @@
               <a:rPr lang="en-US" dirty="0" smtClean="0"/>
               <a:t>algorithm”</a:t>
             </a:r>
-            <a:endParaRPr lang="en-US" dirty="0" smtClean="0"/>
           </a:p>
           <a:p>
             <a:r>
@@ -9455,11 +9486,7 @@
           <a:p>
             <a:r>
               <a:rPr lang="en-US" dirty="0" smtClean="0"/>
-              <a:t>If score is higher tha</a:t>
-            </a:r>
-            <a:r>
-              <a:rPr lang="en-US" dirty="0" smtClean="0"/>
-              <a:t>n previous, keep key</a:t>
+              <a:t>If score is higher than previous, keep key</a:t>
             </a:r>
           </a:p>
           <a:p>
@@ -9532,8 +9559,8 @@
           </a:p>
         </p:txBody>
       </p:sp>
-      <mc:AlternateContent xmlns:mc="http://schemas.openxmlformats.org/markup-compatibility/2006">
-        <mc:Choice xmlns:a14="http://schemas.microsoft.com/office/drawing/2010/main" Requires="a14">
+      <mc:AlternateContent xmlns:mc="http://schemas.openxmlformats.org/markup-compatibility/2006" xmlns:a14="http://schemas.microsoft.com/office/drawing/2010/main">
+        <mc:Choice Requires="a14">
           <p:sp>
             <p:nvSpPr>
               <p:cNvPr id="3" name="Content Placeholder 2"/>
@@ -9669,7 +9696,7 @@
             </p:txBody>
           </p:sp>
         </mc:Choice>
-        <mc:Fallback>
+        <mc:Fallback xmlns="">
           <p:sp>
             <p:nvSpPr>
               <p:cNvPr id="3" name="Content Placeholder 2"/>
@@ -9768,7 +9795,9 @@
         </p:nvSpPr>
         <p:spPr/>
         <p:txBody>
-          <a:bodyPr/>
+          <a:bodyPr>
+            <a:normAutofit lnSpcReduction="10000"/>
+          </a:bodyPr>
           <a:lstStyle/>
           <a:p>
             <a:r>
@@ -9809,7 +9838,6 @@
               <a:rPr lang="en-US" dirty="0" smtClean="0"/>
               <a:t>Adjusting key length</a:t>
             </a:r>
-            <a:endParaRPr lang="en-US" dirty="0" smtClean="0"/>
           </a:p>
           <a:p>
             <a:r>
@@ -9821,8 +9849,30 @@
             <a:pPr lvl="1"/>
             <a:r>
               <a:rPr lang="en-US" dirty="0" smtClean="0"/>
-              <a:t>90-minute test</a:t>
-            </a:r>
+              <a:t>90-minute </a:t>
+            </a:r>
+            <a:r>
+              <a:rPr lang="en-US" dirty="0" smtClean="0"/>
+              <a:t>test</a:t>
+            </a:r>
+          </a:p>
+          <a:p>
+            <a:r>
+              <a:rPr lang="en-US" dirty="0" smtClean="0"/>
+              <a:t>Incorrec</a:t>
+            </a:r>
+            <a:r>
+              <a:rPr lang="en-US" dirty="0" smtClean="0"/>
+              <a:t>t output</a:t>
+            </a:r>
+          </a:p>
+          <a:p>
+            <a:pPr lvl="1"/>
+            <a:r>
+              <a:rPr lang="en-US" dirty="0" smtClean="0"/>
+              <a:t>Logic error</a:t>
+            </a:r>
+            <a:endParaRPr lang="en-US" dirty="0" smtClean="0"/>
           </a:p>
           <a:p>
             <a:pPr marL="0" indent="0">
@@ -9920,34 +9970,7 @@
           <a:p>
             <a:r>
               <a:rPr lang="en-US" dirty="0" smtClean="0"/>
-              <a:t>Screenshots of output (long vs short) time</a:t>
-            </a:r>
-          </a:p>
-          <a:p>
-            <a:r>
-              <a:rPr lang="en-US" dirty="0" smtClean="0"/>
-              <a:t>Run a short version of console</a:t>
-            </a:r>
-          </a:p>
-          <a:p>
-            <a:pPr lvl="1"/>
-            <a:r>
-              <a:rPr lang="en-US" dirty="0" smtClean="0"/>
-              <a:t>Translation</a:t>
-            </a:r>
-          </a:p>
-          <a:p>
-            <a:pPr lvl="1"/>
-            <a:r>
-              <a:rPr lang="en-US" dirty="0" smtClean="0"/>
-              <a:t>Key</a:t>
-            </a:r>
-          </a:p>
-          <a:p>
-            <a:pPr lvl="1"/>
-            <a:r>
-              <a:rPr lang="en-US" dirty="0" smtClean="0"/>
-              <a:t>Fitness</a:t>
+              <a:t>Console demo</a:t>
             </a:r>
             <a:endParaRPr lang="en-US" dirty="0" smtClean="0"/>
           </a:p>
@@ -10034,11 +10057,7 @@
             </a:r>
             <a:r>
               <a:rPr lang="en-US" dirty="0" smtClean="0"/>
-              <a:t>hat we would have done </a:t>
-            </a:r>
-            <a:r>
-              <a:rPr lang="en-US" dirty="0" smtClean="0"/>
-              <a:t>different</a:t>
+              <a:t>hat we would have done different</a:t>
             </a:r>
           </a:p>
           <a:p>
@@ -10054,16 +10073,11 @@
               <a:rPr lang="en-US" dirty="0" smtClean="0"/>
               <a:t>Same algorithm, different encryption method</a:t>
             </a:r>
-            <a:endParaRPr lang="en-US" dirty="0" smtClean="0"/>
           </a:p>
           <a:p>
             <a:r>
               <a:rPr lang="en-US" dirty="0" smtClean="0"/>
-              <a:t>What technologies would </a:t>
-            </a:r>
-            <a:r>
-              <a:rPr lang="en-US" dirty="0" smtClean="0"/>
-              <a:t>help</a:t>
+              <a:t>What technologies would help</a:t>
             </a:r>
           </a:p>
           <a:p>
@@ -10078,11 +10092,7 @@
             <a:pPr lvl="1"/>
             <a:r>
               <a:rPr lang="en-US" dirty="0" smtClean="0"/>
-              <a:t>A.I. seems to be the choice </a:t>
-            </a:r>
-            <a:r>
-              <a:rPr lang="en-US" dirty="0" smtClean="0"/>
-              <a:t>here</a:t>
+              <a:t>A.I. seems to be the choice here</a:t>
             </a:r>
           </a:p>
           <a:p>
@@ -10097,7 +10107,6 @@
               <a:rPr lang="en-US" dirty="0" smtClean="0"/>
               <a:t>Playfair implementation, annealing algorithm, ease of Playfair use versus difficulty to crack, analysis of decryption, character frequency use</a:t>
             </a:r>
-            <a:endParaRPr lang="en-US" dirty="0" smtClean="0"/>
           </a:p>
         </p:txBody>
       </p:sp>

</xml_diff>